<commit_message>
Updated presentation with refresh button
</commit_message>
<xml_diff>
--- a/Presentation/Presentation.pptx
+++ b/Presentation/Presentation.pptx
@@ -218,7 +218,7 @@
           <a:p>
             <a:fld id="{BB421941-27F0-4FF8-BBA8-22D642FB991A}" type="datetimeFigureOut">
               <a:rPr lang="it-IT" smtClean="0"/>
-              <a:t>17/02/2019</a:t>
+              <a:t>18/02/2019</a:t>
             </a:fld>
             <a:endParaRPr lang="it-IT" dirty="0"/>
           </a:p>
@@ -1230,7 +1230,7 @@
           <a:p>
             <a:fld id="{4CD583CD-9EC2-4840-B1BE-910780BF68B0}" type="datetime1">
               <a:rPr lang="it-IT" smtClean="0"/>
-              <a:t>17/02/2019</a:t>
+              <a:t>18/02/2019</a:t>
             </a:fld>
             <a:endParaRPr lang="it-IT" dirty="0"/>
           </a:p>
@@ -1486,7 +1486,7 @@
           <a:p>
             <a:fld id="{4CD583CD-9EC2-4840-B1BE-910780BF68B0}" type="datetime1">
               <a:rPr lang="it-IT" smtClean="0"/>
-              <a:t>17/02/2019</a:t>
+              <a:t>18/02/2019</a:t>
             </a:fld>
             <a:endParaRPr lang="it-IT" dirty="0"/>
           </a:p>
@@ -1805,7 +1805,7 @@
           <a:p>
             <a:fld id="{4CD583CD-9EC2-4840-B1BE-910780BF68B0}" type="datetime1">
               <a:rPr lang="it-IT" smtClean="0"/>
-              <a:t>17/02/2019</a:t>
+              <a:t>18/02/2019</a:t>
             </a:fld>
             <a:endParaRPr lang="it-IT" dirty="0"/>
           </a:p>
@@ -2143,7 +2143,7 @@
           <a:p>
             <a:fld id="{4CD583CD-9EC2-4840-B1BE-910780BF68B0}" type="datetime1">
               <a:rPr lang="it-IT" smtClean="0"/>
-              <a:t>17/02/2019</a:t>
+              <a:t>18/02/2019</a:t>
             </a:fld>
             <a:endParaRPr lang="it-IT" dirty="0"/>
           </a:p>
@@ -2462,7 +2462,7 @@
           <a:p>
             <a:fld id="{4CD583CD-9EC2-4840-B1BE-910780BF68B0}" type="datetime1">
               <a:rPr lang="it-IT" smtClean="0"/>
-              <a:t>17/02/2019</a:t>
+              <a:t>18/02/2019</a:t>
             </a:fld>
             <a:endParaRPr lang="it-IT" dirty="0"/>
           </a:p>
@@ -2860,7 +2860,7 @@
           <a:p>
             <a:fld id="{4CD583CD-9EC2-4840-B1BE-910780BF68B0}" type="datetime1">
               <a:rPr lang="it-IT" smtClean="0"/>
-              <a:t>17/02/2019</a:t>
+              <a:t>18/02/2019</a:t>
             </a:fld>
             <a:endParaRPr lang="it-IT" dirty="0"/>
           </a:p>
@@ -3035,7 +3035,7 @@
           <a:p>
             <a:fld id="{4CD583CD-9EC2-4840-B1BE-910780BF68B0}" type="datetime1">
               <a:rPr lang="it-IT" smtClean="0"/>
-              <a:t>17/02/2019</a:t>
+              <a:t>18/02/2019</a:t>
             </a:fld>
             <a:endParaRPr lang="it-IT" dirty="0"/>
           </a:p>
@@ -3220,7 +3220,7 @@
           <a:p>
             <a:fld id="{4CD583CD-9EC2-4840-B1BE-910780BF68B0}" type="datetime1">
               <a:rPr lang="it-IT" smtClean="0"/>
-              <a:t>17/02/2019</a:t>
+              <a:t>18/02/2019</a:t>
             </a:fld>
             <a:endParaRPr lang="it-IT" dirty="0"/>
           </a:p>
@@ -3395,7 +3395,7 @@
           <a:p>
             <a:fld id="{4CD583CD-9EC2-4840-B1BE-910780BF68B0}" type="datetime1">
               <a:rPr lang="it-IT" smtClean="0"/>
-              <a:t>17/02/2019</a:t>
+              <a:t>18/02/2019</a:t>
             </a:fld>
             <a:endParaRPr lang="it-IT" dirty="0"/>
           </a:p>
@@ -3647,7 +3647,7 @@
           <a:p>
             <a:fld id="{4CD583CD-9EC2-4840-B1BE-910780BF68B0}" type="datetime1">
               <a:rPr lang="it-IT" smtClean="0"/>
-              <a:t>17/02/2019</a:t>
+              <a:t>18/02/2019</a:t>
             </a:fld>
             <a:endParaRPr lang="it-IT" dirty="0"/>
           </a:p>
@@ -3884,7 +3884,7 @@
           <a:p>
             <a:fld id="{4CD583CD-9EC2-4840-B1BE-910780BF68B0}" type="datetime1">
               <a:rPr lang="it-IT" smtClean="0"/>
-              <a:t>17/02/2019</a:t>
+              <a:t>18/02/2019</a:t>
             </a:fld>
             <a:endParaRPr lang="it-IT" dirty="0"/>
           </a:p>
@@ -4263,7 +4263,7 @@
           <a:p>
             <a:fld id="{4CD583CD-9EC2-4840-B1BE-910780BF68B0}" type="datetime1">
               <a:rPr lang="it-IT" smtClean="0"/>
-              <a:t>17/02/2019</a:t>
+              <a:t>18/02/2019</a:t>
             </a:fld>
             <a:endParaRPr lang="it-IT" dirty="0"/>
           </a:p>
@@ -4391,7 +4391,7 @@
           <a:p>
             <a:fld id="{4CD583CD-9EC2-4840-B1BE-910780BF68B0}" type="datetime1">
               <a:rPr lang="it-IT" smtClean="0"/>
-              <a:t>17/02/2019</a:t>
+              <a:t>18/02/2019</a:t>
             </a:fld>
             <a:endParaRPr lang="it-IT" dirty="0"/>
           </a:p>
@@ -4491,7 +4491,7 @@
           <a:p>
             <a:fld id="{4CD583CD-9EC2-4840-B1BE-910780BF68B0}" type="datetime1">
               <a:rPr lang="it-IT" smtClean="0"/>
-              <a:t>17/02/2019</a:t>
+              <a:t>18/02/2019</a:t>
             </a:fld>
             <a:endParaRPr lang="it-IT" dirty="0"/>
           </a:p>
@@ -4751,7 +4751,7 @@
           <a:p>
             <a:fld id="{4CD583CD-9EC2-4840-B1BE-910780BF68B0}" type="datetime1">
               <a:rPr lang="it-IT" smtClean="0"/>
-              <a:t>17/02/2019</a:t>
+              <a:t>18/02/2019</a:t>
             </a:fld>
             <a:endParaRPr lang="it-IT" dirty="0"/>
           </a:p>
@@ -5064,7 +5064,7 @@
           <a:p>
             <a:fld id="{4CD583CD-9EC2-4840-B1BE-910780BF68B0}" type="datetime1">
               <a:rPr lang="it-IT" smtClean="0"/>
-              <a:t>17/02/2019</a:t>
+              <a:t>18/02/2019</a:t>
             </a:fld>
             <a:endParaRPr lang="it-IT" dirty="0"/>
           </a:p>
@@ -5797,7 +5797,7 @@
           <a:p>
             <a:fld id="{4CD583CD-9EC2-4840-B1BE-910780BF68B0}" type="datetime1">
               <a:rPr lang="it-IT" smtClean="0"/>
-              <a:t>17/02/2019</a:t>
+              <a:t>18/02/2019</a:t>
             </a:fld>
             <a:endParaRPr lang="it-IT" dirty="0"/>
           </a:p>
@@ -6724,7 +6724,7 @@
           <a:p>
             <a:fld id="{4CD583CD-9EC2-4840-B1BE-910780BF68B0}" type="datetime1">
               <a:rPr lang="it-IT" smtClean="0"/>
-              <a:t>17/02/2019</a:t>
+              <a:t>18/02/2019</a:t>
             </a:fld>
             <a:endParaRPr lang="it-IT" dirty="0"/>
           </a:p>
@@ -7489,7 +7489,7 @@
           <a:p>
             <a:fld id="{4CD583CD-9EC2-4840-B1BE-910780BF68B0}" type="datetime1">
               <a:rPr lang="it-IT" smtClean="0"/>
-              <a:t>17/02/2019</a:t>
+              <a:t>18/02/2019</a:t>
             </a:fld>
             <a:endParaRPr lang="it-IT" dirty="0"/>
           </a:p>
@@ -7979,7 +7979,7 @@
           <a:p>
             <a:fld id="{C4A3DDB3-2C50-470D-807C-A56D74322188}" type="datetime1">
               <a:rPr lang="it-IT" smtClean="0"/>
-              <a:t>17/02/2019</a:t>
+              <a:t>18/02/2019</a:t>
             </a:fld>
             <a:endParaRPr lang="it-IT" dirty="0"/>
           </a:p>
@@ -8334,7 +8334,7 @@
           <a:p>
             <a:fld id="{0FCC9CCD-A7FD-4922-8A49-B5175969A536}" type="datetime1">
               <a:rPr lang="it-IT" smtClean="0"/>
-              <a:t>17/02/2019</a:t>
+              <a:t>18/02/2019</a:t>
             </a:fld>
             <a:endParaRPr lang="it-IT" dirty="0"/>
           </a:p>
@@ -8574,7 +8574,7 @@
           <a:p>
             <a:fld id="{5EE1CA1F-3477-4B74-8858-5F669E6781BE}" type="datetime1">
               <a:rPr lang="it-IT" smtClean="0"/>
-              <a:t>17/02/2019</a:t>
+              <a:t>18/02/2019</a:t>
             </a:fld>
             <a:endParaRPr lang="it-IT" dirty="0"/>
           </a:p>
@@ -8789,7 +8789,7 @@
           <a:p>
             <a:fld id="{4CD583CD-9EC2-4840-B1BE-910780BF68B0}" type="datetime1">
               <a:rPr lang="it-IT" smtClean="0"/>
-              <a:t>17/02/2019</a:t>
+              <a:t>18/02/2019</a:t>
             </a:fld>
             <a:endParaRPr lang="it-IT" dirty="0"/>
           </a:p>
@@ -9019,7 +9019,7 @@
           <a:p>
             <a:fld id="{4CD583CD-9EC2-4840-B1BE-910780BF68B0}" type="datetime1">
               <a:rPr lang="it-IT" smtClean="0"/>
-              <a:t>17/02/2019</a:t>
+              <a:t>18/02/2019</a:t>
             </a:fld>
             <a:endParaRPr lang="it-IT" dirty="0"/>
           </a:p>
@@ -9162,7 +9162,7 @@
           <a:p>
             <a:fld id="{5EE1CA1F-3477-4B74-8858-5F669E6781BE}" type="datetime1">
               <a:rPr lang="it-IT" smtClean="0"/>
-              <a:t>17/02/2019</a:t>
+              <a:t>18/02/2019</a:t>
             </a:fld>
             <a:endParaRPr lang="it-IT" dirty="0"/>
           </a:p>
@@ -9244,131 +9244,12 @@
           <a:chExt cx="0" cy="0"/>
         </a:xfrm>
       </p:grpSpPr>
-      <p:sp>
-        <p:nvSpPr>
-          <p:cNvPr id="2" name="Title 1">
+      <p:pic>
+        <p:nvPicPr>
+          <p:cNvPr id="7" name="Picture 6">
             <a:extLst>
               <a:ext uri="{FF2B5EF4-FFF2-40B4-BE49-F238E27FC236}">
-                <a16:creationId xmlns:a16="http://schemas.microsoft.com/office/drawing/2014/main" id="{D1611AB7-FAE7-4C06-8686-E9D5C33DF428}"/>
-              </a:ext>
-            </a:extLst>
-          </p:cNvPr>
-          <p:cNvSpPr>
-            <a:spLocks noGrp="1"/>
-          </p:cNvSpPr>
-          <p:nvPr>
-            <p:ph type="title"/>
-          </p:nvPr>
-        </p:nvSpPr>
-        <p:spPr/>
-        <p:txBody>
-          <a:bodyPr/>
-          <a:lstStyle/>
-          <a:p>
-            <a:r>
-              <a:rPr lang="it-IT" dirty="0">
-                <a:solidFill>
-                  <a:srgbClr val="2AB8EA"/>
-                </a:solidFill>
-              </a:rPr>
-              <a:t>Home screen (5.2 inch phone)</a:t>
-            </a:r>
-          </a:p>
-        </p:txBody>
-      </p:sp>
-      <p:sp>
-        <p:nvSpPr>
-          <p:cNvPr id="4" name="Date Placeholder 3">
-            <a:extLst>
-              <a:ext uri="{FF2B5EF4-FFF2-40B4-BE49-F238E27FC236}">
-                <a16:creationId xmlns:a16="http://schemas.microsoft.com/office/drawing/2014/main" id="{DDE2A65C-C7B5-47C9-9D65-32ACBD332D75}"/>
-              </a:ext>
-            </a:extLst>
-          </p:cNvPr>
-          <p:cNvSpPr>
-            <a:spLocks noGrp="1"/>
-          </p:cNvSpPr>
-          <p:nvPr>
-            <p:ph type="dt" sz="half" idx="10"/>
-          </p:nvPr>
-        </p:nvSpPr>
-        <p:spPr/>
-        <p:txBody>
-          <a:bodyPr/>
-          <a:lstStyle/>
-          <a:p>
-            <a:fld id="{4CD583CD-9EC2-4840-B1BE-910780BF68B0}" type="datetime1">
-              <a:rPr lang="it-IT" smtClean="0"/>
-              <a:t>17/02/2019</a:t>
-            </a:fld>
-            <a:endParaRPr lang="it-IT" dirty="0"/>
-          </a:p>
-        </p:txBody>
-      </p:sp>
-      <p:sp>
-        <p:nvSpPr>
-          <p:cNvPr id="5" name="Footer Placeholder 4">
-            <a:extLst>
-              <a:ext uri="{FF2B5EF4-FFF2-40B4-BE49-F238E27FC236}">
-                <a16:creationId xmlns:a16="http://schemas.microsoft.com/office/drawing/2014/main" id="{FCD344B2-262F-4813-9CD4-490B8504AC8E}"/>
-              </a:ext>
-            </a:extLst>
-          </p:cNvPr>
-          <p:cNvSpPr>
-            <a:spLocks noGrp="1"/>
-          </p:cNvSpPr>
-          <p:nvPr>
-            <p:ph type="ftr" sz="quarter" idx="11"/>
-          </p:nvPr>
-        </p:nvSpPr>
-        <p:spPr/>
-        <p:txBody>
-          <a:bodyPr/>
-          <a:lstStyle/>
-          <a:p>
-            <a:r>
-              <a:rPr lang="it-IT"/>
-              <a:t>Riccardo Facchini</a:t>
-            </a:r>
-            <a:endParaRPr lang="it-IT" dirty="0"/>
-          </a:p>
-        </p:txBody>
-      </p:sp>
-      <p:sp>
-        <p:nvSpPr>
-          <p:cNvPr id="6" name="Slide Number Placeholder 5">
-            <a:extLst>
-              <a:ext uri="{FF2B5EF4-FFF2-40B4-BE49-F238E27FC236}">
-                <a16:creationId xmlns:a16="http://schemas.microsoft.com/office/drawing/2014/main" id="{F39C6A64-F5E7-4ABE-92FE-A137786ACCFA}"/>
-              </a:ext>
-            </a:extLst>
-          </p:cNvPr>
-          <p:cNvSpPr>
-            <a:spLocks noGrp="1"/>
-          </p:cNvSpPr>
-          <p:nvPr>
-            <p:ph type="sldNum" sz="quarter" idx="12"/>
-          </p:nvPr>
-        </p:nvSpPr>
-        <p:spPr/>
-        <p:txBody>
-          <a:bodyPr/>
-          <a:lstStyle/>
-          <a:p>
-            <a:fld id="{851FB635-D0C7-42A3-9751-EF99E4EA3797}" type="slidenum">
-              <a:rPr lang="it-IT" smtClean="0"/>
-              <a:t>8</a:t>
-            </a:fld>
-            <a:endParaRPr lang="it-IT" dirty="0"/>
-          </a:p>
-        </p:txBody>
-      </p:sp>
-      <p:pic>
-        <p:nvPicPr>
-          <p:cNvPr id="8" name="Picture 7">
-            <a:extLst>
-              <a:ext uri="{FF2B5EF4-FFF2-40B4-BE49-F238E27FC236}">
-                <a16:creationId xmlns:a16="http://schemas.microsoft.com/office/drawing/2014/main" id="{F2F6A4E3-91DB-4F5C-B526-2413339CAF1D}"/>
+                <a16:creationId xmlns:a16="http://schemas.microsoft.com/office/drawing/2014/main" id="{0E31C50C-9346-43D2-9896-ED90587D5E28}"/>
               </a:ext>
             </a:extLst>
           </p:cNvPr>
@@ -9391,7 +9272,7 @@
         </p:blipFill>
         <p:spPr>
           <a:xfrm>
-            <a:off x="818428" y="1270000"/>
+            <a:off x="851333" y="1270000"/>
             <a:ext cx="2615911" cy="4650509"/>
           </a:xfrm>
           <a:prstGeom prst="rect">
@@ -9399,6 +9280,125 @@
           </a:prstGeom>
         </p:spPr>
       </p:pic>
+      <p:sp>
+        <p:nvSpPr>
+          <p:cNvPr id="2" name="Title 1">
+            <a:extLst>
+              <a:ext uri="{FF2B5EF4-FFF2-40B4-BE49-F238E27FC236}">
+                <a16:creationId xmlns:a16="http://schemas.microsoft.com/office/drawing/2014/main" id="{D1611AB7-FAE7-4C06-8686-E9D5C33DF428}"/>
+              </a:ext>
+            </a:extLst>
+          </p:cNvPr>
+          <p:cNvSpPr>
+            <a:spLocks noGrp="1"/>
+          </p:cNvSpPr>
+          <p:nvPr>
+            <p:ph type="title"/>
+          </p:nvPr>
+        </p:nvSpPr>
+        <p:spPr/>
+        <p:txBody>
+          <a:bodyPr/>
+          <a:lstStyle/>
+          <a:p>
+            <a:r>
+              <a:rPr lang="it-IT" dirty="0">
+                <a:solidFill>
+                  <a:srgbClr val="2AB8EA"/>
+                </a:solidFill>
+              </a:rPr>
+              <a:t>Home screen (5.2 inch phone)</a:t>
+            </a:r>
+          </a:p>
+        </p:txBody>
+      </p:sp>
+      <p:sp>
+        <p:nvSpPr>
+          <p:cNvPr id="4" name="Date Placeholder 3">
+            <a:extLst>
+              <a:ext uri="{FF2B5EF4-FFF2-40B4-BE49-F238E27FC236}">
+                <a16:creationId xmlns:a16="http://schemas.microsoft.com/office/drawing/2014/main" id="{DDE2A65C-C7B5-47C9-9D65-32ACBD332D75}"/>
+              </a:ext>
+            </a:extLst>
+          </p:cNvPr>
+          <p:cNvSpPr>
+            <a:spLocks noGrp="1"/>
+          </p:cNvSpPr>
+          <p:nvPr>
+            <p:ph type="dt" sz="half" idx="10"/>
+          </p:nvPr>
+        </p:nvSpPr>
+        <p:spPr/>
+        <p:txBody>
+          <a:bodyPr/>
+          <a:lstStyle/>
+          <a:p>
+            <a:fld id="{4CD583CD-9EC2-4840-B1BE-910780BF68B0}" type="datetime1">
+              <a:rPr lang="it-IT" smtClean="0"/>
+              <a:t>18/02/2019</a:t>
+            </a:fld>
+            <a:endParaRPr lang="it-IT" dirty="0"/>
+          </a:p>
+        </p:txBody>
+      </p:sp>
+      <p:sp>
+        <p:nvSpPr>
+          <p:cNvPr id="5" name="Footer Placeholder 4">
+            <a:extLst>
+              <a:ext uri="{FF2B5EF4-FFF2-40B4-BE49-F238E27FC236}">
+                <a16:creationId xmlns:a16="http://schemas.microsoft.com/office/drawing/2014/main" id="{FCD344B2-262F-4813-9CD4-490B8504AC8E}"/>
+              </a:ext>
+            </a:extLst>
+          </p:cNvPr>
+          <p:cNvSpPr>
+            <a:spLocks noGrp="1"/>
+          </p:cNvSpPr>
+          <p:nvPr>
+            <p:ph type="ftr" sz="quarter" idx="11"/>
+          </p:nvPr>
+        </p:nvSpPr>
+        <p:spPr/>
+        <p:txBody>
+          <a:bodyPr/>
+          <a:lstStyle/>
+          <a:p>
+            <a:r>
+              <a:rPr lang="it-IT"/>
+              <a:t>Riccardo Facchini</a:t>
+            </a:r>
+            <a:endParaRPr lang="it-IT" dirty="0"/>
+          </a:p>
+        </p:txBody>
+      </p:sp>
+      <p:sp>
+        <p:nvSpPr>
+          <p:cNvPr id="6" name="Slide Number Placeholder 5">
+            <a:extLst>
+              <a:ext uri="{FF2B5EF4-FFF2-40B4-BE49-F238E27FC236}">
+                <a16:creationId xmlns:a16="http://schemas.microsoft.com/office/drawing/2014/main" id="{F39C6A64-F5E7-4ABE-92FE-A137786ACCFA}"/>
+              </a:ext>
+            </a:extLst>
+          </p:cNvPr>
+          <p:cNvSpPr>
+            <a:spLocks noGrp="1"/>
+          </p:cNvSpPr>
+          <p:nvPr>
+            <p:ph type="sldNum" sz="quarter" idx="12"/>
+          </p:nvPr>
+        </p:nvSpPr>
+        <p:spPr/>
+        <p:txBody>
+          <a:bodyPr/>
+          <a:lstStyle/>
+          <a:p>
+            <a:fld id="{851FB635-D0C7-42A3-9751-EF99E4EA3797}" type="slidenum">
+              <a:rPr lang="it-IT" smtClean="0"/>
+              <a:t>8</a:t>
+            </a:fld>
+            <a:endParaRPr lang="it-IT" dirty="0"/>
+          </a:p>
+        </p:txBody>
+      </p:sp>
       <p:sp>
         <p:nvSpPr>
           <p:cNvPr id="12" name="Rectangle 11">
@@ -9612,7 +9612,7 @@
           <p:nvPr/>
         </p:nvPicPr>
         <p:blipFill rotWithShape="1">
-          <a:blip r:embed="rId2">
+          <a:blip r:embed="rId3">
             <a:extLst>
               <a:ext uri="{28A0092B-C50C-407E-A947-70E740481C1C}">
                 <a14:useLocalDpi xmlns:a14="http://schemas.microsoft.com/office/drawing/2010/main" val="0"/>
@@ -9746,7 +9746,7 @@
           <p:nvPr/>
         </p:nvPicPr>
         <p:blipFill rotWithShape="1">
-          <a:blip r:embed="rId3">
+          <a:blip r:embed="rId4">
             <a:extLst>
               <a:ext uri="{28A0092B-C50C-407E-A947-70E740481C1C}">
                 <a14:useLocalDpi xmlns:a14="http://schemas.microsoft.com/office/drawing/2010/main" val="0"/>
@@ -9811,6 +9811,123 @@
           </a:fontRef>
         </p:style>
       </p:cxnSp>
+      <p:sp>
+        <p:nvSpPr>
+          <p:cNvPr id="9" name="Rectangle: Rounded Corners 8">
+            <a:extLst>
+              <a:ext uri="{FF2B5EF4-FFF2-40B4-BE49-F238E27FC236}">
+                <a16:creationId xmlns:a16="http://schemas.microsoft.com/office/drawing/2014/main" id="{9AEF4B22-7415-400E-942B-2155D45531EC}"/>
+              </a:ext>
+            </a:extLst>
+          </p:cNvPr>
+          <p:cNvSpPr/>
+          <p:nvPr/>
+        </p:nvSpPr>
+        <p:spPr>
+          <a:xfrm>
+            <a:off x="2836411" y="1450109"/>
+            <a:ext cx="622444" cy="313799"/>
+          </a:xfrm>
+          <a:prstGeom prst="roundRect">
+            <a:avLst/>
+          </a:prstGeom>
+          <a:solidFill>
+            <a:schemeClr val="accent3">
+              <a:alpha val="50000"/>
+            </a:schemeClr>
+          </a:solidFill>
+          <a:ln>
+            <a:noFill/>
+          </a:ln>
+        </p:spPr>
+        <p:style>
+          <a:lnRef idx="0">
+            <a:scrgbClr r="0" g="0" b="0"/>
+          </a:lnRef>
+          <a:fillRef idx="0">
+            <a:scrgbClr r="0" g="0" b="0"/>
+          </a:fillRef>
+          <a:effectRef idx="0">
+            <a:scrgbClr r="0" g="0" b="0"/>
+          </a:effectRef>
+          <a:fontRef idx="minor">
+            <a:schemeClr val="lt1"/>
+          </a:fontRef>
+        </p:style>
+        <p:txBody>
+          <a:bodyPr rtlCol="0" anchor="ctr"/>
+          <a:lstStyle/>
+          <a:p>
+            <a:pPr algn="ctr"/>
+            <a:endParaRPr lang="it-IT"/>
+          </a:p>
+        </p:txBody>
+      </p:sp>
+      <p:sp>
+        <p:nvSpPr>
+          <p:cNvPr id="10" name="TextBox 9">
+            <a:extLst>
+              <a:ext uri="{FF2B5EF4-FFF2-40B4-BE49-F238E27FC236}">
+                <a16:creationId xmlns:a16="http://schemas.microsoft.com/office/drawing/2014/main" id="{2A0E4844-06C8-479A-8B88-258AD5B73D86}"/>
+              </a:ext>
+            </a:extLst>
+          </p:cNvPr>
+          <p:cNvSpPr txBox="1"/>
+          <p:nvPr/>
+        </p:nvSpPr>
+        <p:spPr>
+          <a:xfrm>
+            <a:off x="3408134" y="1207858"/>
+            <a:ext cx="1441030" cy="646331"/>
+          </a:xfrm>
+          <a:prstGeom prst="rect">
+            <a:avLst/>
+          </a:prstGeom>
+          <a:noFill/>
+        </p:spPr>
+        <p:txBody>
+          <a:bodyPr wrap="square" rtlCol="0">
+            <a:spAutoFit/>
+          </a:bodyPr>
+          <a:lstStyle/>
+          <a:p>
+            <a:pPr algn="ctr"/>
+            <a:r>
+              <a:rPr lang="it-IT" dirty="0">
+                <a:solidFill>
+                  <a:srgbClr val="00B050"/>
+                </a:solidFill>
+                <a:effectLst>
+                  <a:outerShdw blurRad="38100" dist="38100" dir="2700000" algn="tl">
+                    <a:srgbClr val="000000">
+                      <a:alpha val="43137"/>
+                    </a:srgbClr>
+                  </a:outerShdw>
+                </a:effectLst>
+              </a:rPr>
+              <a:t>Refresh and </a:t>
+            </a:r>
+          </a:p>
+          <a:p>
+            <a:pPr algn="ctr"/>
+            <a:r>
+              <a:rPr lang="it-IT" dirty="0">
+                <a:solidFill>
+                  <a:srgbClr val="00B050"/>
+                </a:solidFill>
+                <a:effectLst>
+                  <a:outerShdw blurRad="38100" dist="38100" dir="2700000" algn="tl">
+                    <a:srgbClr val="000000">
+                      <a:alpha val="43137"/>
+                    </a:srgbClr>
+                  </a:outerShdw>
+                </a:effectLst>
+              </a:rPr>
+              <a:t>Sign Out</a:t>
+            </a:r>
+          </a:p>
+        </p:txBody>
+      </p:sp>
     </p:spTree>
     <p:extLst>
       <p:ext uri="{BB962C8B-B14F-4D97-AF65-F5344CB8AC3E}">
@@ -9896,7 +10013,7 @@
           <a:p>
             <a:fld id="{4CD583CD-9EC2-4840-B1BE-910780BF68B0}" type="datetime1">
               <a:rPr lang="it-IT" smtClean="0"/>
-              <a:t>17/02/2019</a:t>
+              <a:t>18/02/2019</a:t>
             </a:fld>
             <a:endParaRPr lang="it-IT" dirty="0"/>
           </a:p>
@@ -9959,12 +10076,100 @@
           </a:p>
         </p:txBody>
       </p:sp>
+      <p:sp>
+        <p:nvSpPr>
+          <p:cNvPr id="11" name="TextBox 10">
+            <a:extLst>
+              <a:ext uri="{FF2B5EF4-FFF2-40B4-BE49-F238E27FC236}">
+                <a16:creationId xmlns:a16="http://schemas.microsoft.com/office/drawing/2014/main" id="{AE74CDF9-C197-457F-8D91-AD524D0E12C5}"/>
+              </a:ext>
+            </a:extLst>
+          </p:cNvPr>
+          <p:cNvSpPr txBox="1"/>
+          <p:nvPr/>
+        </p:nvSpPr>
+        <p:spPr>
+          <a:xfrm>
+            <a:off x="1035446" y="5680419"/>
+            <a:ext cx="2558642" cy="369332"/>
+          </a:xfrm>
+          <a:prstGeom prst="rect">
+            <a:avLst/>
+          </a:prstGeom>
+          <a:noFill/>
+        </p:spPr>
+        <p:txBody>
+          <a:bodyPr wrap="square" rtlCol="0">
+            <a:spAutoFit/>
+          </a:bodyPr>
+          <a:lstStyle/>
+          <a:p>
+            <a:pPr algn="ctr"/>
+            <a:r>
+              <a:rPr lang="it-IT" dirty="0">
+                <a:effectLst>
+                  <a:outerShdw blurRad="38100" dist="38100" dir="2700000" algn="tl">
+                    <a:srgbClr val="000000">
+                      <a:alpha val="43137"/>
+                    </a:srgbClr>
+                  </a:outerShdw>
+                </a:effectLst>
+              </a:rPr>
+              <a:t>Portrait</a:t>
+            </a:r>
+          </a:p>
+        </p:txBody>
+      </p:sp>
+      <p:sp>
+        <p:nvSpPr>
+          <p:cNvPr id="22" name="TextBox 21">
+            <a:extLst>
+              <a:ext uri="{FF2B5EF4-FFF2-40B4-BE49-F238E27FC236}">
+                <a16:creationId xmlns:a16="http://schemas.microsoft.com/office/drawing/2014/main" id="{240907C8-268D-40C4-A0F0-A12C6CBBC6BF}"/>
+              </a:ext>
+            </a:extLst>
+          </p:cNvPr>
+          <p:cNvSpPr txBox="1"/>
+          <p:nvPr/>
+        </p:nvSpPr>
+        <p:spPr>
+          <a:xfrm>
+            <a:off x="6309890" y="5680419"/>
+            <a:ext cx="2558642" cy="369332"/>
+          </a:xfrm>
+          <a:prstGeom prst="rect">
+            <a:avLst/>
+          </a:prstGeom>
+          <a:noFill/>
+        </p:spPr>
+        <p:txBody>
+          <a:bodyPr wrap="square" rtlCol="0">
+            <a:spAutoFit/>
+          </a:bodyPr>
+          <a:lstStyle/>
+          <a:p>
+            <a:pPr algn="ctr"/>
+            <a:r>
+              <a:rPr lang="it-IT" dirty="0">
+                <a:effectLst>
+                  <a:outerShdw blurRad="38100" dist="38100" dir="2700000" algn="tl">
+                    <a:srgbClr val="000000">
+                      <a:alpha val="43137"/>
+                    </a:srgbClr>
+                  </a:outerShdw>
+                </a:effectLst>
+              </a:rPr>
+              <a:t>Landscape</a:t>
+            </a:r>
+          </a:p>
+        </p:txBody>
+      </p:sp>
       <p:pic>
         <p:nvPicPr>
-          <p:cNvPr id="7" name="Picture 6">
+          <p:cNvPr id="8" name="Picture 7">
             <a:extLst>
               <a:ext uri="{FF2B5EF4-FFF2-40B4-BE49-F238E27FC236}">
-                <a16:creationId xmlns:a16="http://schemas.microsoft.com/office/drawing/2014/main" id="{0F141A07-9E17-4BB5-8FE8-AC1CAC17B238}"/>
+                <a16:creationId xmlns:a16="http://schemas.microsoft.com/office/drawing/2014/main" id="{8216EEEB-27C3-4775-8176-CB1DC548EDA1}"/>
               </a:ext>
             </a:extLst>
           </p:cNvPr>
@@ -9987,8 +10192,8 @@
         </p:blipFill>
         <p:spPr>
           <a:xfrm>
-            <a:off x="677334" y="1265383"/>
-            <a:ext cx="3274867" cy="4366490"/>
+            <a:off x="4868641" y="1270000"/>
+            <a:ext cx="5584921" cy="4188691"/>
           </a:xfrm>
           <a:prstGeom prst="rect">
             <a:avLst/>
@@ -9997,10 +10202,10 @@
       </p:pic>
       <p:pic>
         <p:nvPicPr>
-          <p:cNvPr id="10" name="Picture 9">
+          <p:cNvPr id="12" name="Picture 11">
             <a:extLst>
               <a:ext uri="{FF2B5EF4-FFF2-40B4-BE49-F238E27FC236}">
-                <a16:creationId xmlns:a16="http://schemas.microsoft.com/office/drawing/2014/main" id="{1712A7BB-9FE7-46D8-AF18-55F118C9942E}"/>
+                <a16:creationId xmlns:a16="http://schemas.microsoft.com/office/drawing/2014/main" id="{1B8E947D-3C13-4450-AB4E-84387E95F500}"/>
               </a:ext>
             </a:extLst>
           </p:cNvPr>
@@ -10023,102 +10228,14 @@
         </p:blipFill>
         <p:spPr>
           <a:xfrm>
-            <a:off x="4796751" y="1443181"/>
-            <a:ext cx="5584921" cy="4188691"/>
+            <a:off x="692054" y="1304305"/>
+            <a:ext cx="3245426" cy="4327234"/>
           </a:xfrm>
           <a:prstGeom prst="rect">
             <a:avLst/>
           </a:prstGeom>
         </p:spPr>
       </p:pic>
-      <p:sp>
-        <p:nvSpPr>
-          <p:cNvPr id="11" name="TextBox 10">
-            <a:extLst>
-              <a:ext uri="{FF2B5EF4-FFF2-40B4-BE49-F238E27FC236}">
-                <a16:creationId xmlns:a16="http://schemas.microsoft.com/office/drawing/2014/main" id="{AE74CDF9-C197-457F-8D91-AD524D0E12C5}"/>
-              </a:ext>
-            </a:extLst>
-          </p:cNvPr>
-          <p:cNvSpPr txBox="1"/>
-          <p:nvPr/>
-        </p:nvSpPr>
-        <p:spPr>
-          <a:xfrm>
-            <a:off x="1035446" y="5680419"/>
-            <a:ext cx="2558642" cy="369332"/>
-          </a:xfrm>
-          <a:prstGeom prst="rect">
-            <a:avLst/>
-          </a:prstGeom>
-          <a:noFill/>
-        </p:spPr>
-        <p:txBody>
-          <a:bodyPr wrap="square" rtlCol="0">
-            <a:spAutoFit/>
-          </a:bodyPr>
-          <a:lstStyle/>
-          <a:p>
-            <a:pPr algn="ctr"/>
-            <a:r>
-              <a:rPr lang="it-IT" dirty="0">
-                <a:effectLst>
-                  <a:outerShdw blurRad="38100" dist="38100" dir="2700000" algn="tl">
-                    <a:srgbClr val="000000">
-                      <a:alpha val="43137"/>
-                    </a:srgbClr>
-                  </a:outerShdw>
-                </a:effectLst>
-              </a:rPr>
-              <a:t>Portrait</a:t>
-            </a:r>
-          </a:p>
-        </p:txBody>
-      </p:sp>
-      <p:sp>
-        <p:nvSpPr>
-          <p:cNvPr id="22" name="TextBox 21">
-            <a:extLst>
-              <a:ext uri="{FF2B5EF4-FFF2-40B4-BE49-F238E27FC236}">
-                <a16:creationId xmlns:a16="http://schemas.microsoft.com/office/drawing/2014/main" id="{240907C8-268D-40C4-A0F0-A12C6CBBC6BF}"/>
-              </a:ext>
-            </a:extLst>
-          </p:cNvPr>
-          <p:cNvSpPr txBox="1"/>
-          <p:nvPr/>
-        </p:nvSpPr>
-        <p:spPr>
-          <a:xfrm>
-            <a:off x="6309890" y="5680419"/>
-            <a:ext cx="2558642" cy="369332"/>
-          </a:xfrm>
-          <a:prstGeom prst="rect">
-            <a:avLst/>
-          </a:prstGeom>
-          <a:noFill/>
-        </p:spPr>
-        <p:txBody>
-          <a:bodyPr wrap="square" rtlCol="0">
-            <a:spAutoFit/>
-          </a:bodyPr>
-          <a:lstStyle/>
-          <a:p>
-            <a:pPr algn="ctr"/>
-            <a:r>
-              <a:rPr lang="it-IT" dirty="0">
-                <a:effectLst>
-                  <a:outerShdw blurRad="38100" dist="38100" dir="2700000" algn="tl">
-                    <a:srgbClr val="000000">
-                      <a:alpha val="43137"/>
-                    </a:srgbClr>
-                  </a:outerShdw>
-                </a:effectLst>
-              </a:rPr>
-              <a:t>Landscape</a:t>
-            </a:r>
-          </a:p>
-        </p:txBody>
-      </p:sp>
     </p:spTree>
     <p:extLst>
       <p:ext uri="{BB962C8B-B14F-4D97-AF65-F5344CB8AC3E}">

</xml_diff>